<commit_message>
more figures for report
</commit_message>
<xml_diff>
--- a/Figures/Figures.pptx
+++ b/Figures/Figures.pptx
@@ -11,6 +11,7 @@
     <p:sldId id="259" r:id="rId5"/>
     <p:sldId id="260" r:id="rId6"/>
     <p:sldId id="261" r:id="rId7"/>
+    <p:sldId id="262" r:id="rId8"/>
   </p:sldIdLst>
   <p:sldSz cx="12192000" cy="6858000"/>
   <p:notesSz cx="6858000" cy="9144000"/>
@@ -264,7 +265,7 @@
           <a:p>
             <a:fld id="{5FD76617-C15C-47C7-A635-A3CC72DFB9FA}" type="datetimeFigureOut">
               <a:rPr lang="en-US" smtClean="0"/>
-              <a:t>12/30/2023</a:t>
+              <a:t>12/31/2023</a:t>
             </a:fld>
             <a:endParaRPr lang="en-US"/>
           </a:p>
@@ -462,7 +463,7 @@
           <a:p>
             <a:fld id="{5FD76617-C15C-47C7-A635-A3CC72DFB9FA}" type="datetimeFigureOut">
               <a:rPr lang="en-US" smtClean="0"/>
-              <a:t>12/30/2023</a:t>
+              <a:t>12/31/2023</a:t>
             </a:fld>
             <a:endParaRPr lang="en-US"/>
           </a:p>
@@ -670,7 +671,7 @@
           <a:p>
             <a:fld id="{5FD76617-C15C-47C7-A635-A3CC72DFB9FA}" type="datetimeFigureOut">
               <a:rPr lang="en-US" smtClean="0"/>
-              <a:t>12/30/2023</a:t>
+              <a:t>12/31/2023</a:t>
             </a:fld>
             <a:endParaRPr lang="en-US"/>
           </a:p>
@@ -868,7 +869,7 @@
           <a:p>
             <a:fld id="{5FD76617-C15C-47C7-A635-A3CC72DFB9FA}" type="datetimeFigureOut">
               <a:rPr lang="en-US" smtClean="0"/>
-              <a:t>12/30/2023</a:t>
+              <a:t>12/31/2023</a:t>
             </a:fld>
             <a:endParaRPr lang="en-US"/>
           </a:p>
@@ -1143,7 +1144,7 @@
           <a:p>
             <a:fld id="{5FD76617-C15C-47C7-A635-A3CC72DFB9FA}" type="datetimeFigureOut">
               <a:rPr lang="en-US" smtClean="0"/>
-              <a:t>12/30/2023</a:t>
+              <a:t>12/31/2023</a:t>
             </a:fld>
             <a:endParaRPr lang="en-US"/>
           </a:p>
@@ -1408,7 +1409,7 @@
           <a:p>
             <a:fld id="{5FD76617-C15C-47C7-A635-A3CC72DFB9FA}" type="datetimeFigureOut">
               <a:rPr lang="en-US" smtClean="0"/>
-              <a:t>12/30/2023</a:t>
+              <a:t>12/31/2023</a:t>
             </a:fld>
             <a:endParaRPr lang="en-US"/>
           </a:p>
@@ -1820,7 +1821,7 @@
           <a:p>
             <a:fld id="{5FD76617-C15C-47C7-A635-A3CC72DFB9FA}" type="datetimeFigureOut">
               <a:rPr lang="en-US" smtClean="0"/>
-              <a:t>12/30/2023</a:t>
+              <a:t>12/31/2023</a:t>
             </a:fld>
             <a:endParaRPr lang="en-US"/>
           </a:p>
@@ -1961,7 +1962,7 @@
           <a:p>
             <a:fld id="{5FD76617-C15C-47C7-A635-A3CC72DFB9FA}" type="datetimeFigureOut">
               <a:rPr lang="en-US" smtClean="0"/>
-              <a:t>12/30/2023</a:t>
+              <a:t>12/31/2023</a:t>
             </a:fld>
             <a:endParaRPr lang="en-US"/>
           </a:p>
@@ -2074,7 +2075,7 @@
           <a:p>
             <a:fld id="{5FD76617-C15C-47C7-A635-A3CC72DFB9FA}" type="datetimeFigureOut">
               <a:rPr lang="en-US" smtClean="0"/>
-              <a:t>12/30/2023</a:t>
+              <a:t>12/31/2023</a:t>
             </a:fld>
             <a:endParaRPr lang="en-US"/>
           </a:p>
@@ -2385,7 +2386,7 @@
           <a:p>
             <a:fld id="{5FD76617-C15C-47C7-A635-A3CC72DFB9FA}" type="datetimeFigureOut">
               <a:rPr lang="en-US" smtClean="0"/>
-              <a:t>12/30/2023</a:t>
+              <a:t>12/31/2023</a:t>
             </a:fld>
             <a:endParaRPr lang="en-US"/>
           </a:p>
@@ -2673,7 +2674,7 @@
           <a:p>
             <a:fld id="{5FD76617-C15C-47C7-A635-A3CC72DFB9FA}" type="datetimeFigureOut">
               <a:rPr lang="en-US" smtClean="0"/>
-              <a:t>12/30/2023</a:t>
+              <a:t>12/31/2023</a:t>
             </a:fld>
             <a:endParaRPr lang="en-US"/>
           </a:p>
@@ -2914,7 +2915,7 @@
           <a:p>
             <a:fld id="{5FD76617-C15C-47C7-A635-A3CC72DFB9FA}" type="datetimeFigureOut">
               <a:rPr lang="en-US" smtClean="0"/>
-              <a:t>12/30/2023</a:t>
+              <a:t>12/31/2023</a:t>
             </a:fld>
             <a:endParaRPr lang="en-US"/>
           </a:p>
@@ -5449,7 +5450,7 @@
         </p:blipFill>
         <p:spPr>
           <a:xfrm>
-            <a:off x="0" y="0"/>
+            <a:off x="-13960" y="0"/>
             <a:ext cx="4111692" cy="5535261"/>
           </a:xfrm>
           <a:prstGeom prst="rect">
@@ -5485,7 +5486,7 @@
         </p:blipFill>
         <p:spPr>
           <a:xfrm>
-            <a:off x="3968616" y="0"/>
+            <a:off x="4052376" y="0"/>
             <a:ext cx="4111692" cy="5535261"/>
           </a:xfrm>
           <a:prstGeom prst="rect">
@@ -5521,7 +5522,7 @@
         </p:blipFill>
         <p:spPr>
           <a:xfrm>
-            <a:off x="8080308" y="0"/>
+            <a:off x="8129168" y="0"/>
             <a:ext cx="4111692" cy="5535261"/>
           </a:xfrm>
           <a:prstGeom prst="rect">
@@ -5533,6 +5534,126 @@
     <p:extLst>
       <p:ext uri="{BB962C8B-B14F-4D97-AF65-F5344CB8AC3E}">
         <p14:creationId xmlns:p14="http://schemas.microsoft.com/office/powerpoint/2010/main" val="738589197"/>
+      </p:ext>
+    </p:extLst>
+  </p:cSld>
+  <p:clrMapOvr>
+    <a:masterClrMapping/>
+  </p:clrMapOvr>
+</p:sld>
+</file>
+
+<file path=ppt/slides/slide7.xml><?xml version="1.0" encoding="utf-8"?>
+<p:sld xmlns:a="http://schemas.openxmlformats.org/drawingml/2006/main" xmlns:r="http://schemas.openxmlformats.org/officeDocument/2006/relationships" xmlns:p="http://schemas.openxmlformats.org/presentationml/2006/main">
+  <p:cSld>
+    <p:spTree>
+      <p:nvGrpSpPr>
+        <p:cNvPr id="1" name=""/>
+        <p:cNvGrpSpPr/>
+        <p:nvPr/>
+      </p:nvGrpSpPr>
+      <p:grpSpPr>
+        <a:xfrm>
+          <a:off x="0" y="0"/>
+          <a:ext cx="0" cy="0"/>
+          <a:chOff x="0" y="0"/>
+          <a:chExt cx="0" cy="0"/>
+        </a:xfrm>
+      </p:grpSpPr>
+      <p:pic>
+        <p:nvPicPr>
+          <p:cNvPr id="14" name="Picture 13">
+            <a:extLst>
+              <a:ext uri="{FF2B5EF4-FFF2-40B4-BE49-F238E27FC236}">
+                <a16:creationId xmlns:a16="http://schemas.microsoft.com/office/drawing/2014/main" id="{2B79AD8C-1108-2A13-B52A-D44182746AAE}"/>
+              </a:ext>
+            </a:extLst>
+          </p:cNvPr>
+          <p:cNvPicPr>
+            <a:picLocks noChangeAspect="1"/>
+          </p:cNvPicPr>
+          <p:nvPr/>
+        </p:nvPicPr>
+        <p:blipFill>
+          <a:blip r:embed="rId2"/>
+          <a:stretch>
+            <a:fillRect/>
+          </a:stretch>
+        </p:blipFill>
+        <p:spPr>
+          <a:xfrm>
+            <a:off x="0" y="1"/>
+            <a:ext cx="4092635" cy="5667884"/>
+          </a:xfrm>
+          <a:prstGeom prst="rect">
+            <a:avLst/>
+          </a:prstGeom>
+        </p:spPr>
+      </p:pic>
+      <p:pic>
+        <p:nvPicPr>
+          <p:cNvPr id="16" name="Picture 15">
+            <a:extLst>
+              <a:ext uri="{FF2B5EF4-FFF2-40B4-BE49-F238E27FC236}">
+                <a16:creationId xmlns:a16="http://schemas.microsoft.com/office/drawing/2014/main" id="{E4D9D46E-908B-1047-1A27-F1B2343009EB}"/>
+              </a:ext>
+            </a:extLst>
+          </p:cNvPr>
+          <p:cNvPicPr>
+            <a:picLocks noChangeAspect="1"/>
+          </p:cNvPicPr>
+          <p:nvPr/>
+        </p:nvPicPr>
+        <p:blipFill>
+          <a:blip r:embed="rId3"/>
+          <a:stretch>
+            <a:fillRect/>
+          </a:stretch>
+        </p:blipFill>
+        <p:spPr>
+          <a:xfrm>
+            <a:off x="4049682" y="0"/>
+            <a:ext cx="4092635" cy="5667884"/>
+          </a:xfrm>
+          <a:prstGeom prst="rect">
+            <a:avLst/>
+          </a:prstGeom>
+        </p:spPr>
+      </p:pic>
+      <p:pic>
+        <p:nvPicPr>
+          <p:cNvPr id="18" name="Picture 17">
+            <a:extLst>
+              <a:ext uri="{FF2B5EF4-FFF2-40B4-BE49-F238E27FC236}">
+                <a16:creationId xmlns:a16="http://schemas.microsoft.com/office/drawing/2014/main" id="{615F5341-7D28-53CF-5097-E71E3DD58B75}"/>
+              </a:ext>
+            </a:extLst>
+          </p:cNvPr>
+          <p:cNvPicPr>
+            <a:picLocks noChangeAspect="1"/>
+          </p:cNvPicPr>
+          <p:nvPr/>
+        </p:nvPicPr>
+        <p:blipFill>
+          <a:blip r:embed="rId4"/>
+          <a:stretch>
+            <a:fillRect/>
+          </a:stretch>
+        </p:blipFill>
+        <p:spPr>
+          <a:xfrm>
+            <a:off x="8099365" y="0"/>
+            <a:ext cx="4092635" cy="5667884"/>
+          </a:xfrm>
+          <a:prstGeom prst="rect">
+            <a:avLst/>
+          </a:prstGeom>
+        </p:spPr>
+      </p:pic>
+    </p:spTree>
+    <p:extLst>
+      <p:ext uri="{BB962C8B-B14F-4D97-AF65-F5344CB8AC3E}">
+        <p14:creationId xmlns:p14="http://schemas.microsoft.com/office/powerpoint/2010/main" val="629024400"/>
       </p:ext>
     </p:extLst>
   </p:cSld>

</xml_diff>